<commit_message>
novos rotulos qua e qui e novos graficos transfer 110 e transc
</commit_message>
<xml_diff>
--- a/Template/Endurance.pptx
+++ b/Template/Endurance.pptx
@@ -3270,6 +3270,30 @@
         <p:spPr>
           <a:xfrm>
             <a:off x="4762500" y="1097280"/>
+            <a:ext cx="4762500" cy="4762500"/>
+          </a:xfrm>
+          <a:prstGeom prst="rect">
+            <a:avLst/>
+          </a:prstGeom>
+        </p:spPr>
+      </p:pic>
+      <p:pic>
+        <p:nvPicPr>
+          <p:cNvPr id="6" name="Picture 5" descr="Stability Standard Chip 7 Disp 1_KCl_0.8 V.png"/>
+          <p:cNvPicPr>
+            <a:picLocks noChangeAspect="1"/>
+          </p:cNvPicPr>
+          <p:nvPr/>
+        </p:nvPicPr>
+        <p:blipFill>
+          <a:blip r:embed="rId5"/>
+          <a:stretch>
+            <a:fillRect/>
+          </a:stretch>
+        </p:blipFill>
+        <p:spPr>
+          <a:xfrm>
+            <a:off x="0" y="1097280"/>
             <a:ext cx="4762500" cy="4762500"/>
           </a:xfrm>
           <a:prstGeom prst="rect">

</xml_diff>